<commit_message>
poster template: moved to BMC
</commit_message>
<xml_diff>
--- a/poster-template.pptx
+++ b/poster-template.pptx
@@ -115,855 +115,6 @@
 </p:presentation>
 </file>
 
-<file path=ppt/charts/chart1.xml><?xml version="1.0" encoding="utf-8"?>
-<c:chartSpace xmlns:c="http://schemas.openxmlformats.org/drawingml/2006/chart" xmlns:a="http://schemas.openxmlformats.org/drawingml/2006/main" xmlns:r="http://schemas.openxmlformats.org/officeDocument/2006/relationships" xmlns:c16r2="http://schemas.microsoft.com/office/drawing/2015/06/chart">
-  <c:date1904 val="0"/>
-  <c:lang val="en-US"/>
-  <c:roundedCorners val="0"/>
-  <mc:AlternateContent xmlns:mc="http://schemas.openxmlformats.org/markup-compatibility/2006">
-    <mc:Choice xmlns:c14="http://schemas.microsoft.com/office/drawing/2007/8/2/chart" Requires="c14">
-      <c14:style val="102"/>
-    </mc:Choice>
-    <mc:Fallback>
-      <c:style val="2"/>
-    </mc:Fallback>
-  </mc:AlternateContent>
-  <c:chart>
-    <c:autoTitleDeleted val="1"/>
-    <c:plotArea>
-      <c:layout>
-        <c:manualLayout>
-          <c:layoutTarget val="inner"/>
-          <c:xMode val="edge"/>
-          <c:yMode val="edge"/>
-          <c:x val="0.234045201234752"/>
-          <c:y val="4.6520546428223203E-2"/>
-          <c:w val="0.72186033244717096"/>
-          <c:h val="0.85693433175609501"/>
-        </c:manualLayout>
-      </c:layout>
-      <c:barChart>
-        <c:barDir val="col"/>
-        <c:grouping val="clustered"/>
-        <c:varyColors val="0"/>
-        <c:ser>
-          <c:idx val="0"/>
-          <c:order val="0"/>
-          <c:spPr>
-            <a:solidFill>
-              <a:schemeClr val="accent2"/>
-            </a:solidFill>
-            <a:ln>
-              <a:noFill/>
-            </a:ln>
-            <a:effectLst/>
-          </c:spPr>
-          <c:invertIfNegative val="0"/>
-          <c:dPt>
-            <c:idx val="0"/>
-            <c:invertIfNegative val="0"/>
-            <c:bubble3D val="0"/>
-            <c:spPr>
-              <a:solidFill>
-                <a:schemeClr val="accent6">
-                  <a:lumMod val="75000"/>
-                </a:schemeClr>
-              </a:solidFill>
-              <a:ln>
-                <a:noFill/>
-              </a:ln>
-              <a:effectLst/>
-            </c:spPr>
-            <c:extLst>
-              <c:ext xmlns:c16="http://schemas.microsoft.com/office/drawing/2014/chart" uri="{C3380CC4-5D6E-409C-BE32-E72D297353CC}">
-                <c16:uniqueId val="{00000001-EF5F-314C-9F51-8FD673E7D3D2}"/>
-              </c:ext>
-            </c:extLst>
-          </c:dPt>
-          <c:dPt>
-            <c:idx val="1"/>
-            <c:invertIfNegative val="0"/>
-            <c:bubble3D val="0"/>
-            <c:spPr>
-              <a:solidFill>
-                <a:schemeClr val="accent6">
-                  <a:lumMod val="60000"/>
-                  <a:lumOff val="40000"/>
-                </a:schemeClr>
-              </a:solidFill>
-              <a:ln w="0">
-                <a:solidFill>
-                  <a:schemeClr val="accent1"/>
-                </a:solidFill>
-              </a:ln>
-              <a:effectLst/>
-            </c:spPr>
-            <c:extLst>
-              <c:ext xmlns:c16="http://schemas.microsoft.com/office/drawing/2014/chart" uri="{C3380CC4-5D6E-409C-BE32-E72D297353CC}">
-                <c16:uniqueId val="{00000003-EF5F-314C-9F51-8FD673E7D3D2}"/>
-              </c:ext>
-            </c:extLst>
-          </c:dPt>
-          <c:dPt>
-            <c:idx val="2"/>
-            <c:invertIfNegative val="0"/>
-            <c:bubble3D val="0"/>
-            <c:spPr>
-              <a:solidFill>
-                <a:schemeClr val="accent6">
-                  <a:lumMod val="50000"/>
-                </a:schemeClr>
-              </a:solidFill>
-              <a:ln>
-                <a:noFill/>
-              </a:ln>
-              <a:effectLst/>
-            </c:spPr>
-            <c:extLst>
-              <c:ext xmlns:c16="http://schemas.microsoft.com/office/drawing/2014/chart" uri="{C3380CC4-5D6E-409C-BE32-E72D297353CC}">
-                <c16:uniqueId val="{00000005-EF5F-314C-9F51-8FD673E7D3D2}"/>
-              </c:ext>
-            </c:extLst>
-          </c:dPt>
-          <c:cat>
-            <c:strRef>
-              <c:f>'[Chart in Microsoft Office PowerPoint]Sheet1'!$B$1:$D$1</c:f>
-              <c:strCache>
-                <c:ptCount val="3"/>
-                <c:pt idx="0">
-                  <c:v>PPDB 2.0</c:v>
-                </c:pt>
-                <c:pt idx="1">
-                  <c:v>W2V</c:v>
-                </c:pt>
-                <c:pt idx="2">
-                  <c:v>ECO2</c:v>
-                </c:pt>
-              </c:strCache>
-            </c:strRef>
-          </c:cat>
-          <c:val>
-            <c:numRef>
-              <c:f>'[Chart in Microsoft Office PowerPoint]Sheet1'!$B$2:$D$2</c:f>
-              <c:numCache>
-                <c:formatCode>General</c:formatCode>
-                <c:ptCount val="3"/>
-                <c:pt idx="0">
-                  <c:v>0.70250000000000001</c:v>
-                </c:pt>
-                <c:pt idx="1">
-                  <c:v>0.59550000000000003</c:v>
-                </c:pt>
-                <c:pt idx="2">
-                  <c:v>0.72230000000000005</c:v>
-                </c:pt>
-              </c:numCache>
-            </c:numRef>
-          </c:val>
-          <c:extLst>
-            <c:ext xmlns:c16="http://schemas.microsoft.com/office/drawing/2014/chart" uri="{C3380CC4-5D6E-409C-BE32-E72D297353CC}">
-              <c16:uniqueId val="{00000006-EF5F-314C-9F51-8FD673E7D3D2}"/>
-            </c:ext>
-          </c:extLst>
-        </c:ser>
-        <c:dLbls>
-          <c:showLegendKey val="0"/>
-          <c:showVal val="0"/>
-          <c:showCatName val="0"/>
-          <c:showSerName val="0"/>
-          <c:showPercent val="0"/>
-          <c:showBubbleSize val="0"/>
-        </c:dLbls>
-        <c:gapWidth val="0"/>
-        <c:overlap val="-22"/>
-        <c:axId val="-168791056"/>
-        <c:axId val="-168788736"/>
-      </c:barChart>
-      <c:catAx>
-        <c:axId val="-168791056"/>
-        <c:scaling>
-          <c:orientation val="minMax"/>
-        </c:scaling>
-        <c:delete val="0"/>
-        <c:axPos val="b"/>
-        <c:numFmt formatCode="General" sourceLinked="1"/>
-        <c:majorTickMark val="none"/>
-        <c:minorTickMark val="none"/>
-        <c:tickLblPos val="nextTo"/>
-        <c:spPr>
-          <a:noFill/>
-          <a:ln w="9525" cap="flat" cmpd="sng" algn="ctr">
-            <a:solidFill>
-              <a:schemeClr val="tx1">
-                <a:lumMod val="15000"/>
-                <a:lumOff val="85000"/>
-              </a:schemeClr>
-            </a:solidFill>
-            <a:round/>
-          </a:ln>
-          <a:effectLst/>
-        </c:spPr>
-        <c:txPr>
-          <a:bodyPr rot="-60000000" spcFirstLastPara="1" vertOverflow="ellipsis" vert="horz" wrap="square" anchor="ctr" anchorCtr="1"/>
-          <a:lstStyle/>
-          <a:p>
-            <a:pPr>
-              <a:defRPr sz="3000" b="0" i="0" u="none" strike="noStrike" kern="1200" baseline="0">
-                <a:solidFill>
-                  <a:schemeClr val="tx1">
-                    <a:lumMod val="65000"/>
-                    <a:lumOff val="35000"/>
-                  </a:schemeClr>
-                </a:solidFill>
-                <a:latin typeface="Candara" charset="0"/>
-                <a:ea typeface="Candara" charset="0"/>
-                <a:cs typeface="Candara" charset="0"/>
-              </a:defRPr>
-            </a:pPr>
-            <a:endParaRPr lang="en-US"/>
-          </a:p>
-        </c:txPr>
-        <c:crossAx val="-168788736"/>
-        <c:crosses val="autoZero"/>
-        <c:auto val="1"/>
-        <c:lblAlgn val="ctr"/>
-        <c:lblOffset val="100"/>
-        <c:noMultiLvlLbl val="0"/>
-      </c:catAx>
-      <c:valAx>
-        <c:axId val="-168788736"/>
-        <c:scaling>
-          <c:orientation val="minMax"/>
-          <c:max val="0.75"/>
-          <c:min val="0"/>
-        </c:scaling>
-        <c:delete val="0"/>
-        <c:axPos val="l"/>
-        <c:majorGridlines>
-          <c:spPr>
-            <a:ln w="9525" cap="flat" cmpd="sng" algn="ctr">
-              <a:solidFill>
-                <a:schemeClr val="tx1">
-                  <a:lumMod val="15000"/>
-                  <a:lumOff val="85000"/>
-                </a:schemeClr>
-              </a:solidFill>
-              <a:round/>
-            </a:ln>
-            <a:effectLst/>
-          </c:spPr>
-        </c:majorGridlines>
-        <c:numFmt formatCode="General" sourceLinked="0"/>
-        <c:majorTickMark val="none"/>
-        <c:minorTickMark val="none"/>
-        <c:tickLblPos val="nextTo"/>
-        <c:spPr>
-          <a:noFill/>
-          <a:ln>
-            <a:noFill/>
-          </a:ln>
-          <a:effectLst/>
-        </c:spPr>
-        <c:txPr>
-          <a:bodyPr rot="-60000000" spcFirstLastPara="1" vertOverflow="ellipsis" vert="horz" wrap="square" anchor="ctr" anchorCtr="1"/>
-          <a:lstStyle/>
-          <a:p>
-            <a:pPr>
-              <a:defRPr sz="2400" b="0" i="0" u="none" strike="noStrike" kern="1200" baseline="0">
-                <a:solidFill>
-                  <a:schemeClr val="tx1">
-                    <a:lumMod val="65000"/>
-                    <a:lumOff val="35000"/>
-                  </a:schemeClr>
-                </a:solidFill>
-                <a:latin typeface="Candara" charset="0"/>
-                <a:ea typeface="Candara" charset="0"/>
-                <a:cs typeface="Candara" charset="0"/>
-              </a:defRPr>
-            </a:pPr>
-            <a:endParaRPr lang="en-US"/>
-          </a:p>
-        </c:txPr>
-        <c:crossAx val="-168791056"/>
-        <c:crosses val="autoZero"/>
-        <c:crossBetween val="between"/>
-        <c:majorUnit val="0.1"/>
-      </c:valAx>
-      <c:spPr>
-        <a:noFill/>
-        <a:ln>
-          <a:noFill/>
-        </a:ln>
-        <a:effectLst/>
-      </c:spPr>
-    </c:plotArea>
-    <c:plotVisOnly val="1"/>
-    <c:dispBlanksAs val="gap"/>
-    <c:showDLblsOverMax val="0"/>
-  </c:chart>
-  <c:spPr>
-    <a:noFill/>
-    <a:ln>
-      <a:noFill/>
-    </a:ln>
-    <a:effectLst/>
-  </c:spPr>
-  <c:txPr>
-    <a:bodyPr/>
-    <a:lstStyle/>
-    <a:p>
-      <a:pPr>
-        <a:defRPr/>
-      </a:pPr>
-      <a:endParaRPr lang="en-US"/>
-    </a:p>
-  </c:txPr>
-  <c:externalData r:id="rId3">
-    <c:autoUpdate val="0"/>
-  </c:externalData>
-</c:chartSpace>
-</file>
-
-<file path=ppt/charts/colors1.xml><?xml version="1.0" encoding="utf-8"?>
-<cs:colorStyle xmlns:cs="http://schemas.microsoft.com/office/drawing/2012/chartStyle" xmlns:a="http://schemas.openxmlformats.org/drawingml/2006/main" meth="cycle" id="12">
-  <a:schemeClr val="accent2"/>
-  <a:schemeClr val="accent4"/>
-  <a:schemeClr val="accent6"/>
-  <cs:variation/>
-  <cs:variation>
-    <a:lumMod val="60000"/>
-  </cs:variation>
-  <cs:variation>
-    <a:lumMod val="80000"/>
-    <a:lumOff val="20000"/>
-  </cs:variation>
-  <cs:variation>
-    <a:lumMod val="80000"/>
-  </cs:variation>
-  <cs:variation>
-    <a:lumMod val="60000"/>
-    <a:lumOff val="40000"/>
-  </cs:variation>
-  <cs:variation>
-    <a:lumMod val="50000"/>
-  </cs:variation>
-  <cs:variation>
-    <a:lumMod val="70000"/>
-    <a:lumOff val="30000"/>
-  </cs:variation>
-  <cs:variation>
-    <a:lumMod val="70000"/>
-  </cs:variation>
-  <cs:variation>
-    <a:lumMod val="50000"/>
-    <a:lumOff val="50000"/>
-  </cs:variation>
-</cs:colorStyle>
-</file>
-
-<file path=ppt/charts/style1.xml><?xml version="1.0" encoding="utf-8"?>
-<cs:chartStyle xmlns:cs="http://schemas.microsoft.com/office/drawing/2012/chartStyle" xmlns:a="http://schemas.openxmlformats.org/drawingml/2006/main" id="201">
-  <cs:axisTitle>
-    <cs:lnRef idx="0"/>
-    <cs:fillRef idx="0"/>
-    <cs:effectRef idx="0"/>
-    <cs:fontRef idx="minor">
-      <a:schemeClr val="tx1">
-        <a:lumMod val="65000"/>
-        <a:lumOff val="35000"/>
-      </a:schemeClr>
-    </cs:fontRef>
-    <cs:defRPr sz="1000" kern="1200"/>
-  </cs:axisTitle>
-  <cs:categoryAxis>
-    <cs:lnRef idx="0"/>
-    <cs:fillRef idx="0"/>
-    <cs:effectRef idx="0"/>
-    <cs:fontRef idx="minor">
-      <a:schemeClr val="tx1">
-        <a:lumMod val="65000"/>
-        <a:lumOff val="35000"/>
-      </a:schemeClr>
-    </cs:fontRef>
-    <cs:spPr>
-      <a:ln w="9525" cap="flat" cmpd="sng" algn="ctr">
-        <a:solidFill>
-          <a:schemeClr val="tx1">
-            <a:lumMod val="15000"/>
-            <a:lumOff val="85000"/>
-          </a:schemeClr>
-        </a:solidFill>
-        <a:round/>
-      </a:ln>
-    </cs:spPr>
-    <cs:defRPr sz="900" kern="1200"/>
-  </cs:categoryAxis>
-  <cs:chartArea mods="allowNoFillOverride allowNoLineOverride">
-    <cs:lnRef idx="0"/>
-    <cs:fillRef idx="0"/>
-    <cs:effectRef idx="0"/>
-    <cs:fontRef idx="minor">
-      <a:schemeClr val="tx1"/>
-    </cs:fontRef>
-    <cs:spPr>
-      <a:solidFill>
-        <a:schemeClr val="bg1"/>
-      </a:solidFill>
-      <a:ln w="9525" cap="flat" cmpd="sng" algn="ctr">
-        <a:solidFill>
-          <a:schemeClr val="tx1">
-            <a:lumMod val="15000"/>
-            <a:lumOff val="85000"/>
-          </a:schemeClr>
-        </a:solidFill>
-        <a:round/>
-      </a:ln>
-    </cs:spPr>
-    <cs:defRPr sz="1000" kern="1200"/>
-  </cs:chartArea>
-  <cs:dataLabel>
-    <cs:lnRef idx="0"/>
-    <cs:fillRef idx="0"/>
-    <cs:effectRef idx="0"/>
-    <cs:fontRef idx="minor">
-      <a:schemeClr val="tx1">
-        <a:lumMod val="75000"/>
-        <a:lumOff val="25000"/>
-      </a:schemeClr>
-    </cs:fontRef>
-    <cs:defRPr sz="900" kern="1200"/>
-  </cs:dataLabel>
-  <cs:dataLabelCallout>
-    <cs:lnRef idx="0"/>
-    <cs:fillRef idx="0"/>
-    <cs:effectRef idx="0"/>
-    <cs:fontRef idx="minor">
-      <a:schemeClr val="dk1">
-        <a:lumMod val="65000"/>
-        <a:lumOff val="35000"/>
-      </a:schemeClr>
-    </cs:fontRef>
-    <cs:spPr>
-      <a:solidFill>
-        <a:schemeClr val="lt1"/>
-      </a:solidFill>
-      <a:ln>
-        <a:solidFill>
-          <a:schemeClr val="dk1">
-            <a:lumMod val="25000"/>
-            <a:lumOff val="75000"/>
-          </a:schemeClr>
-        </a:solidFill>
-      </a:ln>
-    </cs:spPr>
-    <cs:defRPr sz="900" kern="1200"/>
-    <cs:bodyPr rot="0" spcFirstLastPara="1" vertOverflow="clip" horzOverflow="clip" vert="horz" wrap="square" lIns="36576" tIns="18288" rIns="36576" bIns="18288" anchor="ctr" anchorCtr="1">
-      <a:spAutoFit/>
-    </cs:bodyPr>
-  </cs:dataLabelCallout>
-  <cs:dataPoint>
-    <cs:lnRef idx="0"/>
-    <cs:fillRef idx="1">
-      <cs:styleClr val="auto"/>
-    </cs:fillRef>
-    <cs:effectRef idx="0"/>
-    <cs:fontRef idx="minor">
-      <a:schemeClr val="tx1"/>
-    </cs:fontRef>
-  </cs:dataPoint>
-  <cs:dataPoint3D>
-    <cs:lnRef idx="0"/>
-    <cs:fillRef idx="1">
-      <cs:styleClr val="auto"/>
-    </cs:fillRef>
-    <cs:effectRef idx="0"/>
-    <cs:fontRef idx="minor">
-      <a:schemeClr val="tx1"/>
-    </cs:fontRef>
-  </cs:dataPoint3D>
-  <cs:dataPointLine>
-    <cs:lnRef idx="0">
-      <cs:styleClr val="auto"/>
-    </cs:lnRef>
-    <cs:fillRef idx="1"/>
-    <cs:effectRef idx="0"/>
-    <cs:fontRef idx="minor">
-      <a:schemeClr val="tx1"/>
-    </cs:fontRef>
-    <cs:spPr>
-      <a:ln w="28575" cap="rnd">
-        <a:solidFill>
-          <a:schemeClr val="phClr"/>
-        </a:solidFill>
-        <a:round/>
-      </a:ln>
-    </cs:spPr>
-  </cs:dataPointLine>
-  <cs:dataPointMarker>
-    <cs:lnRef idx="0">
-      <cs:styleClr val="auto"/>
-    </cs:lnRef>
-    <cs:fillRef idx="1">
-      <cs:styleClr val="auto"/>
-    </cs:fillRef>
-    <cs:effectRef idx="0"/>
-    <cs:fontRef idx="minor">
-      <a:schemeClr val="tx1"/>
-    </cs:fontRef>
-    <cs:spPr>
-      <a:ln w="9525">
-        <a:solidFill>
-          <a:schemeClr val="phClr"/>
-        </a:solidFill>
-      </a:ln>
-    </cs:spPr>
-  </cs:dataPointMarker>
-  <cs:dataPointMarkerLayout symbol="circle" size="5"/>
-  <cs:dataPointWireframe>
-    <cs:lnRef idx="0">
-      <cs:styleClr val="auto"/>
-    </cs:lnRef>
-    <cs:fillRef idx="1"/>
-    <cs:effectRef idx="0"/>
-    <cs:fontRef idx="minor">
-      <a:schemeClr val="tx1"/>
-    </cs:fontRef>
-    <cs:spPr>
-      <a:ln w="9525" cap="rnd">
-        <a:solidFill>
-          <a:schemeClr val="phClr"/>
-        </a:solidFill>
-        <a:round/>
-      </a:ln>
-    </cs:spPr>
-  </cs:dataPointWireframe>
-  <cs:dataTable>
-    <cs:lnRef idx="0"/>
-    <cs:fillRef idx="0"/>
-    <cs:effectRef idx="0"/>
-    <cs:fontRef idx="minor">
-      <a:schemeClr val="tx1">
-        <a:lumMod val="65000"/>
-        <a:lumOff val="35000"/>
-      </a:schemeClr>
-    </cs:fontRef>
-    <cs:spPr>
-      <a:noFill/>
-      <a:ln w="9525" cap="flat" cmpd="sng" algn="ctr">
-        <a:solidFill>
-          <a:schemeClr val="tx1">
-            <a:lumMod val="15000"/>
-            <a:lumOff val="85000"/>
-          </a:schemeClr>
-        </a:solidFill>
-        <a:round/>
-      </a:ln>
-    </cs:spPr>
-    <cs:defRPr sz="900" kern="1200"/>
-  </cs:dataTable>
-  <cs:downBar>
-    <cs:lnRef idx="0"/>
-    <cs:fillRef idx="0"/>
-    <cs:effectRef idx="0"/>
-    <cs:fontRef idx="minor">
-      <a:schemeClr val="dk1"/>
-    </cs:fontRef>
-    <cs:spPr>
-      <a:solidFill>
-        <a:schemeClr val="dk1">
-          <a:lumMod val="65000"/>
-          <a:lumOff val="35000"/>
-        </a:schemeClr>
-      </a:solidFill>
-      <a:ln w="9525">
-        <a:solidFill>
-          <a:schemeClr val="tx1">
-            <a:lumMod val="65000"/>
-            <a:lumOff val="35000"/>
-          </a:schemeClr>
-        </a:solidFill>
-      </a:ln>
-    </cs:spPr>
-  </cs:downBar>
-  <cs:dropLine>
-    <cs:lnRef idx="0"/>
-    <cs:fillRef idx="0"/>
-    <cs:effectRef idx="0"/>
-    <cs:fontRef idx="minor">
-      <a:schemeClr val="tx1"/>
-    </cs:fontRef>
-    <cs:spPr>
-      <a:ln w="9525" cap="flat" cmpd="sng" algn="ctr">
-        <a:solidFill>
-          <a:schemeClr val="tx1">
-            <a:lumMod val="35000"/>
-            <a:lumOff val="65000"/>
-          </a:schemeClr>
-        </a:solidFill>
-        <a:round/>
-      </a:ln>
-    </cs:spPr>
-  </cs:dropLine>
-  <cs:errorBar>
-    <cs:lnRef idx="0"/>
-    <cs:fillRef idx="0"/>
-    <cs:effectRef idx="0"/>
-    <cs:fontRef idx="minor">
-      <a:schemeClr val="tx1"/>
-    </cs:fontRef>
-    <cs:spPr>
-      <a:ln w="9525" cap="flat" cmpd="sng" algn="ctr">
-        <a:solidFill>
-          <a:schemeClr val="tx1">
-            <a:lumMod val="65000"/>
-            <a:lumOff val="35000"/>
-          </a:schemeClr>
-        </a:solidFill>
-        <a:round/>
-      </a:ln>
-    </cs:spPr>
-  </cs:errorBar>
-  <cs:floor>
-    <cs:lnRef idx="0"/>
-    <cs:fillRef idx="0"/>
-    <cs:effectRef idx="0"/>
-    <cs:fontRef idx="minor">
-      <a:schemeClr val="tx1"/>
-    </cs:fontRef>
-    <cs:spPr>
-      <a:noFill/>
-      <a:ln>
-        <a:noFill/>
-      </a:ln>
-    </cs:spPr>
-  </cs:floor>
-  <cs:gridlineMajor>
-    <cs:lnRef idx="0"/>
-    <cs:fillRef idx="0"/>
-    <cs:effectRef idx="0"/>
-    <cs:fontRef idx="minor">
-      <a:schemeClr val="tx1"/>
-    </cs:fontRef>
-    <cs:spPr>
-      <a:ln w="9525" cap="flat" cmpd="sng" algn="ctr">
-        <a:solidFill>
-          <a:schemeClr val="tx1">
-            <a:lumMod val="15000"/>
-            <a:lumOff val="85000"/>
-          </a:schemeClr>
-        </a:solidFill>
-        <a:round/>
-      </a:ln>
-    </cs:spPr>
-  </cs:gridlineMajor>
-  <cs:gridlineMinor>
-    <cs:lnRef idx="0"/>
-    <cs:fillRef idx="0"/>
-    <cs:effectRef idx="0"/>
-    <cs:fontRef idx="minor">
-      <a:schemeClr val="tx1"/>
-    </cs:fontRef>
-    <cs:spPr>
-      <a:ln w="9525" cap="flat" cmpd="sng" algn="ctr">
-        <a:solidFill>
-          <a:schemeClr val="tx1">
-            <a:lumMod val="5000"/>
-            <a:lumOff val="95000"/>
-          </a:schemeClr>
-        </a:solidFill>
-        <a:round/>
-      </a:ln>
-    </cs:spPr>
-  </cs:gridlineMinor>
-  <cs:hiLoLine>
-    <cs:lnRef idx="0"/>
-    <cs:fillRef idx="0"/>
-    <cs:effectRef idx="0"/>
-    <cs:fontRef idx="minor">
-      <a:schemeClr val="tx1"/>
-    </cs:fontRef>
-    <cs:spPr>
-      <a:ln w="9525" cap="flat" cmpd="sng" algn="ctr">
-        <a:solidFill>
-          <a:schemeClr val="tx1">
-            <a:lumMod val="75000"/>
-            <a:lumOff val="25000"/>
-          </a:schemeClr>
-        </a:solidFill>
-        <a:round/>
-      </a:ln>
-    </cs:spPr>
-  </cs:hiLoLine>
-  <cs:leaderLine>
-    <cs:lnRef idx="0"/>
-    <cs:fillRef idx="0"/>
-    <cs:effectRef idx="0"/>
-    <cs:fontRef idx="minor">
-      <a:schemeClr val="tx1"/>
-    </cs:fontRef>
-    <cs:spPr>
-      <a:ln w="9525" cap="flat" cmpd="sng" algn="ctr">
-        <a:solidFill>
-          <a:schemeClr val="tx1">
-            <a:lumMod val="35000"/>
-            <a:lumOff val="65000"/>
-          </a:schemeClr>
-        </a:solidFill>
-        <a:round/>
-      </a:ln>
-    </cs:spPr>
-  </cs:leaderLine>
-  <cs:legend>
-    <cs:lnRef idx="0"/>
-    <cs:fillRef idx="0"/>
-    <cs:effectRef idx="0"/>
-    <cs:fontRef idx="minor">
-      <a:schemeClr val="tx1">
-        <a:lumMod val="65000"/>
-        <a:lumOff val="35000"/>
-      </a:schemeClr>
-    </cs:fontRef>
-    <cs:defRPr sz="900" kern="1200"/>
-  </cs:legend>
-  <cs:plotArea mods="allowNoFillOverride allowNoLineOverride">
-    <cs:lnRef idx="0"/>
-    <cs:fillRef idx="0"/>
-    <cs:effectRef idx="0"/>
-    <cs:fontRef idx="minor">
-      <a:schemeClr val="tx1"/>
-    </cs:fontRef>
-  </cs:plotArea>
-  <cs:plotArea3D mods="allowNoFillOverride allowNoLineOverride">
-    <cs:lnRef idx="0"/>
-    <cs:fillRef idx="0"/>
-    <cs:effectRef idx="0"/>
-    <cs:fontRef idx="minor">
-      <a:schemeClr val="tx1"/>
-    </cs:fontRef>
-  </cs:plotArea3D>
-  <cs:seriesAxis>
-    <cs:lnRef idx="0"/>
-    <cs:fillRef idx="0"/>
-    <cs:effectRef idx="0"/>
-    <cs:fontRef idx="minor">
-      <a:schemeClr val="tx1">
-        <a:lumMod val="65000"/>
-        <a:lumOff val="35000"/>
-      </a:schemeClr>
-    </cs:fontRef>
-    <cs:defRPr sz="900" kern="1200"/>
-  </cs:seriesAxis>
-  <cs:seriesLine>
-    <cs:lnRef idx="0"/>
-    <cs:fillRef idx="0"/>
-    <cs:effectRef idx="0"/>
-    <cs:fontRef idx="minor">
-      <a:schemeClr val="tx1"/>
-    </cs:fontRef>
-    <cs:spPr>
-      <a:ln w="9525" cap="flat" cmpd="sng" algn="ctr">
-        <a:solidFill>
-          <a:schemeClr val="tx1">
-            <a:lumMod val="35000"/>
-            <a:lumOff val="65000"/>
-          </a:schemeClr>
-        </a:solidFill>
-        <a:round/>
-      </a:ln>
-    </cs:spPr>
-  </cs:seriesLine>
-  <cs:title>
-    <cs:lnRef idx="0"/>
-    <cs:fillRef idx="0"/>
-    <cs:effectRef idx="0"/>
-    <cs:fontRef idx="minor">
-      <a:schemeClr val="tx1">
-        <a:lumMod val="65000"/>
-        <a:lumOff val="35000"/>
-      </a:schemeClr>
-    </cs:fontRef>
-    <cs:defRPr sz="1400" b="0" kern="1200" spc="0" baseline="0"/>
-  </cs:title>
-  <cs:trendline>
-    <cs:lnRef idx="0">
-      <cs:styleClr val="auto"/>
-    </cs:lnRef>
-    <cs:fillRef idx="0"/>
-    <cs:effectRef idx="0"/>
-    <cs:fontRef idx="minor">
-      <a:schemeClr val="tx1"/>
-    </cs:fontRef>
-    <cs:spPr>
-      <a:ln w="19050" cap="rnd">
-        <a:solidFill>
-          <a:schemeClr val="phClr"/>
-        </a:solidFill>
-        <a:prstDash val="sysDot"/>
-      </a:ln>
-    </cs:spPr>
-  </cs:trendline>
-  <cs:trendlineLabel>
-    <cs:lnRef idx="0"/>
-    <cs:fillRef idx="0"/>
-    <cs:effectRef idx="0"/>
-    <cs:fontRef idx="minor">
-      <a:schemeClr val="tx1">
-        <a:lumMod val="65000"/>
-        <a:lumOff val="35000"/>
-      </a:schemeClr>
-    </cs:fontRef>
-    <cs:defRPr sz="900" kern="1200"/>
-  </cs:trendlineLabel>
-  <cs:upBar>
-    <cs:lnRef idx="0"/>
-    <cs:fillRef idx="0"/>
-    <cs:effectRef idx="0"/>
-    <cs:fontRef idx="minor">
-      <a:schemeClr val="dk1"/>
-    </cs:fontRef>
-    <cs:spPr>
-      <a:solidFill>
-        <a:schemeClr val="lt1"/>
-      </a:solidFill>
-      <a:ln w="9525">
-        <a:solidFill>
-          <a:schemeClr val="tx1">
-            <a:lumMod val="15000"/>
-            <a:lumOff val="85000"/>
-          </a:schemeClr>
-        </a:solidFill>
-      </a:ln>
-    </cs:spPr>
-  </cs:upBar>
-  <cs:valueAxis>
-    <cs:lnRef idx="0"/>
-    <cs:fillRef idx="0"/>
-    <cs:effectRef idx="0"/>
-    <cs:fontRef idx="minor">
-      <a:schemeClr val="tx1">
-        <a:lumMod val="65000"/>
-        <a:lumOff val="35000"/>
-      </a:schemeClr>
-    </cs:fontRef>
-    <cs:defRPr sz="900" kern="1200"/>
-  </cs:valueAxis>
-  <cs:wall>
-    <cs:lnRef idx="0"/>
-    <cs:fillRef idx="0"/>
-    <cs:effectRef idx="0"/>
-    <cs:fontRef idx="minor">
-      <a:schemeClr val="tx1"/>
-    </cs:fontRef>
-    <cs:spPr>
-      <a:noFill/>
-      <a:ln>
-        <a:noFill/>
-      </a:ln>
-    </cs:spPr>
-  </cs:wall>
-</cs:chartStyle>
-</file>
-
 <file path=ppt/notesMasters/notesMaster1.xml><?xml version="1.0" encoding="utf-8"?>
 <p:notesMaster xmlns:a="http://schemas.openxmlformats.org/drawingml/2006/main" xmlns:r="http://schemas.openxmlformats.org/officeDocument/2006/relationships" xmlns:p="http://schemas.openxmlformats.org/presentationml/2006/main">
   <p:cSld>
@@ -1046,7 +197,7 @@
           <a:p>
             <a:fld id="{C63F548B-9A4A-8C40-A4BE-592DE65C28C4}" type="datetimeFigureOut">
               <a:rPr lang="en-US" smtClean="0"/>
-              <a:t>7/22/21</a:t>
+              <a:t>5/17/23</a:t>
             </a:fld>
             <a:endParaRPr lang="en-US"/>
           </a:p>
@@ -1642,7 +793,7 @@
           <a:p>
             <a:fld id="{057CA2F9-E54E-1148-953C-28B3A2ACA76A}" type="datetimeFigureOut">
               <a:rPr lang="en-US" smtClean="0"/>
-              <a:t>7/22/21</a:t>
+              <a:t>5/17/23</a:t>
             </a:fld>
             <a:endParaRPr lang="en-US"/>
           </a:p>
@@ -1807,7 +958,7 @@
           <a:p>
             <a:fld id="{057CA2F9-E54E-1148-953C-28B3A2ACA76A}" type="datetimeFigureOut">
               <a:rPr lang="en-US" smtClean="0"/>
-              <a:t>7/22/21</a:t>
+              <a:t>5/17/23</a:t>
             </a:fld>
             <a:endParaRPr lang="en-US"/>
           </a:p>
@@ -1982,7 +1133,7 @@
           <a:p>
             <a:fld id="{057CA2F9-E54E-1148-953C-28B3A2ACA76A}" type="datetimeFigureOut">
               <a:rPr lang="en-US" smtClean="0"/>
-              <a:t>7/22/21</a:t>
+              <a:t>5/17/23</a:t>
             </a:fld>
             <a:endParaRPr lang="en-US"/>
           </a:p>
@@ -2147,7 +1298,7 @@
           <a:p>
             <a:fld id="{057CA2F9-E54E-1148-953C-28B3A2ACA76A}" type="datetimeFigureOut">
               <a:rPr lang="en-US" smtClean="0"/>
-              <a:t>7/22/21</a:t>
+              <a:t>5/17/23</a:t>
             </a:fld>
             <a:endParaRPr lang="en-US"/>
           </a:p>
@@ -2386,7 +1537,7 @@
           <a:p>
             <a:fld id="{057CA2F9-E54E-1148-953C-28B3A2ACA76A}" type="datetimeFigureOut">
               <a:rPr lang="en-US" smtClean="0"/>
-              <a:t>7/22/21</a:t>
+              <a:t>5/17/23</a:t>
             </a:fld>
             <a:endParaRPr lang="en-US"/>
           </a:p>
@@ -2613,7 +1764,7 @@
           <a:p>
             <a:fld id="{057CA2F9-E54E-1148-953C-28B3A2ACA76A}" type="datetimeFigureOut">
               <a:rPr lang="en-US" smtClean="0"/>
-              <a:t>7/22/21</a:t>
+              <a:t>5/17/23</a:t>
             </a:fld>
             <a:endParaRPr lang="en-US"/>
           </a:p>
@@ -2975,7 +2126,7 @@
           <a:p>
             <a:fld id="{057CA2F9-E54E-1148-953C-28B3A2ACA76A}" type="datetimeFigureOut">
               <a:rPr lang="en-US" smtClean="0"/>
-              <a:t>7/22/21</a:t>
+              <a:t>5/17/23</a:t>
             </a:fld>
             <a:endParaRPr lang="en-US"/>
           </a:p>
@@ -3088,7 +2239,7 @@
           <a:p>
             <a:fld id="{057CA2F9-E54E-1148-953C-28B3A2ACA76A}" type="datetimeFigureOut">
               <a:rPr lang="en-US" smtClean="0"/>
-              <a:t>7/22/21</a:t>
+              <a:t>5/17/23</a:t>
             </a:fld>
             <a:endParaRPr lang="en-US"/>
           </a:p>
@@ -3178,7 +2329,7 @@
           <a:p>
             <a:fld id="{057CA2F9-E54E-1148-953C-28B3A2ACA76A}" type="datetimeFigureOut">
               <a:rPr lang="en-US" smtClean="0"/>
-              <a:t>7/22/21</a:t>
+              <a:t>5/17/23</a:t>
             </a:fld>
             <a:endParaRPr lang="en-US"/>
           </a:p>
@@ -3450,7 +2601,7 @@
           <a:p>
             <a:fld id="{057CA2F9-E54E-1148-953C-28B3A2ACA76A}" type="datetimeFigureOut">
               <a:rPr lang="en-US" smtClean="0"/>
-              <a:t>7/22/21</a:t>
+              <a:t>5/17/23</a:t>
             </a:fld>
             <a:endParaRPr lang="en-US"/>
           </a:p>
@@ -3702,7 +2853,7 @@
           <a:p>
             <a:fld id="{057CA2F9-E54E-1148-953C-28B3A2ACA76A}" type="datetimeFigureOut">
               <a:rPr lang="en-US" smtClean="0"/>
-              <a:t>7/22/21</a:t>
+              <a:t>5/17/23</a:t>
             </a:fld>
             <a:endParaRPr lang="en-US"/>
           </a:p>
@@ -3910,7 +3061,7 @@
           <a:p>
             <a:fld id="{057CA2F9-E54E-1148-953C-28B3A2ACA76A}" type="datetimeFigureOut">
               <a:rPr lang="en-US" smtClean="0"/>
-              <a:t>7/22/21</a:t>
+              <a:t>5/17/23</a:t>
             </a:fld>
             <a:endParaRPr lang="en-US"/>
           </a:p>
@@ -4589,30 +3740,6 @@
           </a:p>
         </p:txBody>
       </p:sp>
-      <p:graphicFrame>
-        <p:nvGraphicFramePr>
-          <p:cNvPr id="56" name="Chart 55"/>
-          <p:cNvGraphicFramePr>
-            <a:graphicFrameLocks/>
-          </p:cNvGraphicFramePr>
-          <p:nvPr>
-            <p:extLst>
-              <p:ext uri="{D42A27DB-BD31-4B8C-83A1-F6EECF244321}">
-                <p14:modId xmlns:p14="http://schemas.microsoft.com/office/powerpoint/2010/main" val="1101352439"/>
-              </p:ext>
-            </p:extLst>
-          </p:nvPr>
-        </p:nvGraphicFramePr>
-        <p:xfrm>
-          <a:off x="59896675" y="6907277"/>
-          <a:ext cx="6376919" cy="21223823"/>
-        </p:xfrm>
-        <a:graphic>
-          <a:graphicData uri="http://schemas.openxmlformats.org/drawingml/2006/chart">
-            <c:chart xmlns:c="http://schemas.openxmlformats.org/drawingml/2006/chart" xmlns:r="http://schemas.openxmlformats.org/officeDocument/2006/relationships" r:id="rId3"/>
-          </a:graphicData>
-        </a:graphic>
-      </p:graphicFrame>
       <p:grpSp>
         <p:nvGrpSpPr>
           <p:cNvPr id="12" name="Group 11"/>
@@ -5753,7 +4880,7 @@
             <p:nvPr/>
           </p:nvPicPr>
           <p:blipFill>
-            <a:blip r:embed="rId4">
+            <a:blip r:embed="rId3">
               <a:extLst>
                 <a:ext uri="{28A0092B-C50C-407E-A947-70E740481C1C}">
                   <a14:useLocalDpi xmlns:a14="http://schemas.microsoft.com/office/drawing/2010/main" val="0"/>
@@ -5783,7 +4910,7 @@
             <p:nvPr/>
           </p:nvPicPr>
           <p:blipFill>
-            <a:blip r:embed="rId5">
+            <a:blip r:embed="rId4">
               <a:extLst>
                 <a:ext uri="{28A0092B-C50C-407E-A947-70E740481C1C}">
                   <a14:useLocalDpi xmlns:a14="http://schemas.microsoft.com/office/drawing/2010/main" val="0"/>
@@ -5998,32 +5125,52 @@
       </p:sp>
       <p:pic>
         <p:nvPicPr>
-          <p:cNvPr id="35" name="Picture 34">
+          <p:cNvPr id="1026" name="Picture 2">
             <a:extLst>
               <a:ext uri="{FF2B5EF4-FFF2-40B4-BE49-F238E27FC236}">
-                <a16:creationId xmlns:a16="http://schemas.microsoft.com/office/drawing/2014/main" id="{EB795CF4-DD89-9941-AE8E-80C8065A0D33}"/>
+                <a16:creationId xmlns:a16="http://schemas.microsoft.com/office/drawing/2014/main" id="{440B2B39-2B20-C576-6F9B-DB2C2E318E43}"/>
+              </a:ext>
+              <a:ext uri="{C183D7F6-B498-43B3-948B-1728B52AA6E4}">
+                <adec:decorative xmlns:adec="http://schemas.microsoft.com/office/drawing/2017/decorative" val="1"/>
               </a:ext>
             </a:extLst>
           </p:cNvPr>
           <p:cNvPicPr>
-            <a:picLocks noChangeAspect="1"/>
+            <a:picLocks noChangeAspect="1" noChangeArrowheads="1"/>
           </p:cNvPicPr>
           <p:nvPr/>
         </p:nvPicPr>
         <p:blipFill>
-          <a:blip r:embed="rId6"/>
+          <a:blip r:embed="rId5">
+            <a:extLst>
+              <a:ext uri="{28A0092B-C50C-407E-A947-70E740481C1C}">
+                <a14:useLocalDpi xmlns:a14="http://schemas.microsoft.com/office/drawing/2010/main" val="0"/>
+              </a:ext>
+            </a:extLst>
+          </a:blip>
+          <a:srcRect/>
           <a:stretch>
             <a:fillRect/>
           </a:stretch>
         </p:blipFill>
-        <p:spPr>
+        <p:spPr bwMode="auto">
           <a:xfrm>
-            <a:off x="27728675" y="1048342"/>
-            <a:ext cx="3352624" cy="3097746"/>
+            <a:off x="27535083" y="895575"/>
+            <a:ext cx="4311420" cy="2981907"/>
           </a:xfrm>
           <a:prstGeom prst="rect">
             <a:avLst/>
           </a:prstGeom>
+          <a:noFill/>
+          <a:extLst>
+            <a:ext uri="{909E8E84-426E-40DD-AFC4-6F175D3DCCD1}">
+              <a14:hiddenFill xmlns:a14="http://schemas.microsoft.com/office/drawing/2010/main">
+                <a:solidFill>
+                  <a:srgbClr val="FFFFFF"/>
+                </a:solidFill>
+              </a14:hiddenFill>
+            </a:ext>
+          </a:extLst>
         </p:spPr>
       </p:pic>
     </p:spTree>

</xml_diff>